<commit_message>
Updated title on Estimation Slides
</commit_message>
<xml_diff>
--- a/Agile Firestarter Winter 2011 Agile Estimation.pptx
+++ b/Agile Firestarter Winter 2011 Agile Estimation.pptx
@@ -5394,8 +5394,13 @@
                   <a:schemeClr val="bg1"/>
                 </a:solidFill>
               </a:rPr>
-              <a:t>Dan Berlin</a:t>
-            </a:r>
+              <a:t>Ben Dewey</a:t>
+            </a:r>
+            <a:endParaRPr lang="en-US" sz="2400" kern="0" dirty="0" smtClean="0">
+              <a:solidFill>
+                <a:schemeClr val="bg1"/>
+              </a:solidFill>
+            </a:endParaRPr>
           </a:p>
           <a:p>
             <a:pPr lvl="0" defTabSz="914400" fontAlgn="base">
@@ -5413,7 +5418,15 @@
                   <a:schemeClr val="bg1"/>
                 </a:solidFill>
               </a:rPr>
-              <a:t>Twitter: @</a:t>
+              <a:t>Twitter: </a:t>
+            </a:r>
+            <a:r>
+              <a:rPr lang="en-US" sz="2400" kern="0" dirty="0" smtClean="0">
+                <a:solidFill>
+                  <a:schemeClr val="bg1"/>
+                </a:solidFill>
+              </a:rPr>
+              <a:t>@</a:t>
             </a:r>
             <a:r>
               <a:rPr lang="en-US" sz="2400" kern="0" dirty="0" err="1" smtClean="0">
@@ -5421,7 +5434,7 @@
                   <a:schemeClr val="bg1"/>
                 </a:solidFill>
               </a:rPr>
-              <a:t>DanBerlin</a:t>
+              <a:t>BenDewey</a:t>
             </a:r>
             <a:endParaRPr lang="en-US" sz="2400" kern="0" dirty="0" smtClean="0">
               <a:solidFill>
@@ -5448,12 +5461,12 @@
               <a:t>Email: </a:t>
             </a:r>
             <a:r>
-              <a:rPr lang="en-US" sz="2000" kern="0" dirty="0" err="1" smtClean="0">
+              <a:rPr lang="en-US" sz="2000" kern="0" dirty="0" smtClean="0">
                 <a:solidFill>
                   <a:schemeClr val="bg1"/>
                 </a:solidFill>
               </a:rPr>
-              <a:t>daniel.l.berlin@gmail.com</a:t>
+              <a:t>ben @bendewey.com</a:t>
             </a:r>
             <a:endParaRPr lang="en-US" sz="2000" kern="0" dirty="0" smtClean="0">
               <a:solidFill>

</xml_diff>

<commit_message>
Added Mock PlanningPoker Skit and Slide
</commit_message>
<xml_diff>
--- a/Agile Firestarter Winter 2011 Agile Estimation.pptx
+++ b/Agile Firestarter Winter 2011 Agile Estimation.pptx
@@ -6,7 +6,7 @@
     <p:sldMasterId id="2147483950" r:id="rId2"/>
   </p:sldMasterIdLst>
   <p:notesMasterIdLst>
-    <p:notesMasterId r:id="rId27"/>
+    <p:notesMasterId r:id="rId28"/>
   </p:notesMasterIdLst>
   <p:sldIdLst>
     <p:sldId id="499" r:id="rId3"/>
@@ -27,12 +27,13 @@
     <p:sldId id="519" r:id="rId18"/>
     <p:sldId id="517" r:id="rId19"/>
     <p:sldId id="548" r:id="rId20"/>
-    <p:sldId id="528" r:id="rId21"/>
-    <p:sldId id="521" r:id="rId22"/>
-    <p:sldId id="551" r:id="rId23"/>
-    <p:sldId id="520" r:id="rId24"/>
-    <p:sldId id="522" r:id="rId25"/>
-    <p:sldId id="538" r:id="rId26"/>
+    <p:sldId id="552" r:id="rId21"/>
+    <p:sldId id="528" r:id="rId22"/>
+    <p:sldId id="521" r:id="rId23"/>
+    <p:sldId id="551" r:id="rId24"/>
+    <p:sldId id="520" r:id="rId25"/>
+    <p:sldId id="522" r:id="rId26"/>
+    <p:sldId id="538" r:id="rId27"/>
   </p:sldIdLst>
   <p:sldSz cx="10160000" cy="7620000"/>
   <p:notesSz cx="6858000" cy="9144000"/>
@@ -1573,7 +1574,7 @@
               <a:pPr>
                 <a:defRPr/>
               </a:pPr>
-              <a:t>19</a:t>
+              <a:t>20</a:t>
             </a:fld>
             <a:endParaRPr lang="en-US"/>
           </a:p>
@@ -1664,7 +1665,7 @@
               <a:pPr>
                 <a:defRPr/>
               </a:pPr>
-              <a:t>20</a:t>
+              <a:t>21</a:t>
             </a:fld>
             <a:endParaRPr lang="en-US"/>
           </a:p>
@@ -1787,7 +1788,7 @@
               <a:pPr>
                 <a:defRPr/>
               </a:pPr>
-              <a:t>22</a:t>
+              <a:t>23</a:t>
             </a:fld>
             <a:endParaRPr lang="en-US"/>
           </a:p>
@@ -2027,7 +2028,7 @@
               <a:pPr>
                 <a:defRPr/>
               </a:pPr>
-              <a:t>23</a:t>
+              <a:t>24</a:t>
             </a:fld>
             <a:endParaRPr lang="en-US"/>
           </a:p>
@@ -2114,7 +2115,7 @@
               <a:pPr>
                 <a:defRPr/>
               </a:pPr>
-              <a:t>24</a:t>
+              <a:t>25</a:t>
             </a:fld>
             <a:endParaRPr lang="en-US"/>
           </a:p>
@@ -3697,7 +3698,7 @@
           <a:p>
             <a:fld id="{4573CFDB-05E0-46C9-BA0A-C72AA8C3A001}" type="datetimeFigureOut">
               <a:rPr lang="en-US" smtClean="0"/>
-              <a:t>1/18/2011</a:t>
+              <a:t>1/20/2011</a:t>
             </a:fld>
             <a:endParaRPr lang="en-US"/>
           </a:p>
@@ -3867,7 +3868,7 @@
           <a:p>
             <a:fld id="{4573CFDB-05E0-46C9-BA0A-C72AA8C3A001}" type="datetimeFigureOut">
               <a:rPr lang="en-US" smtClean="0"/>
-              <a:t>1/18/2011</a:t>
+              <a:t>1/20/2011</a:t>
             </a:fld>
             <a:endParaRPr lang="en-US"/>
           </a:p>
@@ -4113,7 +4114,7 @@
           <a:p>
             <a:fld id="{4573CFDB-05E0-46C9-BA0A-C72AA8C3A001}" type="datetimeFigureOut">
               <a:rPr lang="en-US" smtClean="0"/>
-              <a:t>1/18/2011</a:t>
+              <a:t>1/20/2011</a:t>
             </a:fld>
             <a:endParaRPr lang="en-US"/>
           </a:p>
@@ -4401,7 +4402,7 @@
           <a:p>
             <a:fld id="{4573CFDB-05E0-46C9-BA0A-C72AA8C3A001}" type="datetimeFigureOut">
               <a:rPr lang="en-US" smtClean="0"/>
-              <a:t>1/18/2011</a:t>
+              <a:t>1/20/2011</a:t>
             </a:fld>
             <a:endParaRPr lang="en-US"/>
           </a:p>
@@ -4823,7 +4824,7 @@
           <a:p>
             <a:fld id="{4573CFDB-05E0-46C9-BA0A-C72AA8C3A001}" type="datetimeFigureOut">
               <a:rPr lang="en-US" smtClean="0"/>
-              <a:t>1/18/2011</a:t>
+              <a:t>1/20/2011</a:t>
             </a:fld>
             <a:endParaRPr lang="en-US"/>
           </a:p>
@@ -4941,7 +4942,7 @@
           <a:p>
             <a:fld id="{4573CFDB-05E0-46C9-BA0A-C72AA8C3A001}" type="datetimeFigureOut">
               <a:rPr lang="en-US" smtClean="0"/>
-              <a:t>1/18/2011</a:t>
+              <a:t>1/20/2011</a:t>
             </a:fld>
             <a:endParaRPr lang="en-US"/>
           </a:p>
@@ -5036,7 +5037,7 @@
           <a:p>
             <a:fld id="{4573CFDB-05E0-46C9-BA0A-C72AA8C3A001}" type="datetimeFigureOut">
               <a:rPr lang="en-US" smtClean="0"/>
-              <a:t>1/18/2011</a:t>
+              <a:t>1/20/2011</a:t>
             </a:fld>
             <a:endParaRPr lang="en-US"/>
           </a:p>
@@ -5428,7 +5429,7 @@
           <a:p>
             <a:fld id="{4573CFDB-05E0-46C9-BA0A-C72AA8C3A001}" type="datetimeFigureOut">
               <a:rPr lang="en-US" smtClean="0"/>
-              <a:t>1/18/2011</a:t>
+              <a:t>1/20/2011</a:t>
             </a:fld>
             <a:endParaRPr lang="en-US"/>
           </a:p>
@@ -5681,7 +5682,7 @@
           <a:p>
             <a:fld id="{4573CFDB-05E0-46C9-BA0A-C72AA8C3A001}" type="datetimeFigureOut">
               <a:rPr lang="en-US" smtClean="0"/>
-              <a:t>1/18/2011</a:t>
+              <a:t>1/20/2011</a:t>
             </a:fld>
             <a:endParaRPr lang="en-US"/>
           </a:p>
@@ -5851,7 +5852,7 @@
           <a:p>
             <a:fld id="{4573CFDB-05E0-46C9-BA0A-C72AA8C3A001}" type="datetimeFigureOut">
               <a:rPr lang="en-US" smtClean="0"/>
-              <a:t>1/18/2011</a:t>
+              <a:t>1/20/2011</a:t>
             </a:fld>
             <a:endParaRPr lang="en-US"/>
           </a:p>
@@ -6031,7 +6032,7 @@
           <a:p>
             <a:fld id="{4573CFDB-05E0-46C9-BA0A-C72AA8C3A001}" type="datetimeFigureOut">
               <a:rPr lang="en-US" smtClean="0"/>
-              <a:t>1/18/2011</a:t>
+              <a:t>1/20/2011</a:t>
             </a:fld>
             <a:endParaRPr lang="en-US"/>
           </a:p>
@@ -7413,7 +7414,7 @@
             <a:fld id="{F2BCC184-CBE3-4F29-A273-6F4E5CFA4DFC}" type="datetimeFigureOut">
               <a:rPr lang="en-US" smtClean="0"/>
               <a:pPr/>
-              <a:t>1/17/2011</a:t>
+              <a:t>1/20/2011</a:t>
             </a:fld>
             <a:endParaRPr lang="en-US"/>
           </a:p>
@@ -7930,7 +7931,7 @@
           <a:p>
             <a:fld id="{4573CFDB-05E0-46C9-BA0A-C72AA8C3A001}" type="datetimeFigureOut">
               <a:rPr lang="en-US" smtClean="0"/>
-              <a:t>1/18/2011</a:t>
+              <a:t>1/20/2011</a:t>
             </a:fld>
             <a:endParaRPr lang="en-US"/>
           </a:p>
@@ -9005,15 +9006,7 @@
                   <a:srgbClr val="008000"/>
                 </a:solidFill>
               </a:rPr>
-              <a:t> to </a:t>
-            </a:r>
-            <a:r>
-              <a:rPr lang="en-US" sz="2800" dirty="0" smtClean="0">
-                <a:solidFill>
-                  <a:srgbClr val="008000"/>
-                </a:solidFill>
-              </a:rPr>
-              <a:t>see a summary page of all unpaid accounts, </a:t>
+              <a:t> to see a summary page of all unpaid accounts, </a:t>
             </a:r>
             <a:r>
               <a:rPr lang="en-US" sz="2800" b="1" dirty="0" smtClean="0">
@@ -9068,29 +9061,8 @@
                   <a:srgbClr val="FF0000"/>
                 </a:solidFill>
               </a:rPr>
-              <a:t>Our </a:t>
-            </a:r>
-            <a:r>
-              <a:rPr lang="en-US" sz="2800" dirty="0" smtClean="0">
-                <a:solidFill>
-                  <a:srgbClr val="FF0000"/>
-                </a:solidFill>
-              </a:rPr>
-              <a:t>company wants a new website to increase sales</a:t>
-            </a:r>
-            <a:r>
-              <a:rPr lang="en-US" sz="2800" dirty="0" smtClean="0">
-                <a:solidFill>
-                  <a:srgbClr val="FF0000"/>
-                </a:solidFill>
-              </a:rPr>
-              <a:t>.</a:t>
-            </a:r>
-            <a:endParaRPr lang="en-US" sz="2800" dirty="0" smtClean="0">
-              <a:solidFill>
-                <a:srgbClr val="FF0000"/>
-              </a:solidFill>
-            </a:endParaRPr>
+              <a:t>Our company wants a new website to increase sales.</a:t>
+            </a:r>
           </a:p>
         </p:txBody>
       </p:sp>
@@ -10038,7 +10010,7 @@
           <a:p>
             <a:r>
               <a:rPr lang="en-US" dirty="0" smtClean="0"/>
-              <a:t>Story Backlog</a:t>
+              <a:t>Mock Poker</a:t>
             </a:r>
             <a:endParaRPr lang="en-US" dirty="0"/>
           </a:p>
@@ -10054,31 +10026,163 @@
             <p:ph idx="1"/>
           </p:nvPr>
         </p:nvSpPr>
-        <p:spPr/>
-        <p:txBody>
-          <a:bodyPr/>
-          <a:lstStyle/>
-          <a:p>
-            <a:r>
-              <a:rPr lang="en-US" dirty="0" smtClean="0"/>
-              <a:t>This is just a bucket for all your stories</a:t>
-            </a:r>
-          </a:p>
-          <a:p>
-            <a:r>
-              <a:rPr lang="en-US" dirty="0" smtClean="0"/>
-              <a:t>Keep it prioritized and organized!</a:t>
-            </a:r>
-          </a:p>
-          <a:p>
-            <a:r>
-              <a:rPr lang="en-US" dirty="0" smtClean="0"/>
-              <a:t>Pull estimated stories off this list to create an iteration plan</a:t>
+        <p:spPr>
+          <a:xfrm>
+            <a:off x="508000" y="1600200"/>
+            <a:ext cx="9144000" cy="5867400"/>
+          </a:xfrm>
+        </p:spPr>
+        <p:txBody>
+          <a:bodyPr>
+            <a:noAutofit/>
+          </a:bodyPr>
+          <a:lstStyle/>
+          <a:p>
+            <a:pPr marL="0" indent="0">
+              <a:buNone/>
+            </a:pPr>
+            <a:r>
+              <a:rPr lang="en-US" sz="2800" b="1" dirty="0"/>
+              <a:t>Company:</a:t>
+            </a:r>
+          </a:p>
+          <a:p>
+            <a:pPr marL="444496" lvl="1" indent="0">
+              <a:buNone/>
+            </a:pPr>
+            <a:r>
+              <a:rPr lang="en-US" sz="2400" dirty="0"/>
+              <a:t>Robotics </a:t>
+            </a:r>
+            <a:r>
+              <a:rPr lang="en-US" sz="2400" dirty="0" smtClean="0"/>
+              <a:t>Inc. </a:t>
+            </a:r>
+            <a:r>
+              <a:rPr lang="en-US" sz="2400" dirty="0"/>
+              <a:t>sells sensors and circuit boards for electronic enthusiasts. </a:t>
+            </a:r>
+            <a:r>
+              <a:rPr lang="en-US" sz="2400" dirty="0" smtClean="0"/>
+              <a:t>  They </a:t>
+            </a:r>
+            <a:r>
+              <a:rPr lang="en-US" sz="2400" dirty="0"/>
+              <a:t>have an ecommerce website where they sell the products</a:t>
+            </a:r>
+            <a:r>
+              <a:rPr lang="en-US" sz="2400" dirty="0" smtClean="0"/>
+              <a:t>.</a:t>
+            </a:r>
+          </a:p>
+          <a:p>
+            <a:pPr marL="0" indent="0">
+              <a:buNone/>
+            </a:pPr>
+            <a:endParaRPr lang="en-US" sz="2800" dirty="0"/>
+          </a:p>
+          <a:p>
+            <a:pPr marL="0" indent="0">
+              <a:buNone/>
+            </a:pPr>
+            <a:r>
+              <a:rPr lang="en-US" sz="2800" b="1" dirty="0" smtClean="0"/>
+              <a:t>Story:</a:t>
+            </a:r>
+            <a:endParaRPr lang="en-US" sz="2800" dirty="0" smtClean="0"/>
+          </a:p>
+          <a:p>
+            <a:pPr marL="444496" lvl="1" indent="0">
+              <a:buNone/>
+            </a:pPr>
+            <a:r>
+              <a:rPr lang="en-US" sz="2400" dirty="0" smtClean="0"/>
+              <a:t>“</a:t>
+            </a:r>
+            <a:r>
+              <a:rPr lang="en-US" sz="2400" dirty="0"/>
+              <a:t>The User wants to be able to see </a:t>
+            </a:r>
+            <a:r>
+              <a:rPr lang="en-US" sz="2400" dirty="0" smtClean="0"/>
+              <a:t>all the categories </a:t>
+            </a:r>
+            <a:r>
+              <a:rPr lang="en-US" sz="2400" dirty="0"/>
+              <a:t>so that they can select a </a:t>
+            </a:r>
+            <a:r>
+              <a:rPr lang="en-US" sz="2400" dirty="0" smtClean="0"/>
+              <a:t>category </a:t>
+            </a:r>
+            <a:r>
+              <a:rPr lang="en-US" sz="2400" dirty="0"/>
+              <a:t>to view </a:t>
+            </a:r>
+            <a:r>
+              <a:rPr lang="en-US" sz="2400" dirty="0" smtClean="0"/>
+              <a:t>its products.”</a:t>
+            </a:r>
+          </a:p>
+          <a:p>
+            <a:pPr marL="0" indent="0">
+              <a:buNone/>
+            </a:pPr>
+            <a:endParaRPr lang="en-US" sz="2800" b="1" dirty="0" smtClean="0"/>
+          </a:p>
+          <a:p>
+            <a:pPr marL="0" indent="0">
+              <a:buNone/>
+            </a:pPr>
+            <a:r>
+              <a:rPr lang="en-US" sz="2800" b="1" dirty="0" smtClean="0"/>
+              <a:t>Acceptance Criteria:</a:t>
+            </a:r>
+          </a:p>
+          <a:p>
+            <a:r>
+              <a:rPr lang="en-US" sz="2400" dirty="0" smtClean="0"/>
+              <a:t>Given </a:t>
+            </a:r>
+            <a:r>
+              <a:rPr lang="en-US" sz="2400" dirty="0"/>
+              <a:t>a user is on the home page</a:t>
+            </a:r>
+          </a:p>
+          <a:p>
+            <a:pPr lvl="1"/>
+            <a:r>
+              <a:rPr lang="en-US" sz="2000" dirty="0" smtClean="0"/>
+              <a:t>When </a:t>
+            </a:r>
+            <a:r>
+              <a:rPr lang="en-US" sz="2000" dirty="0"/>
+              <a:t>the page loads then the user will see a list of categories.</a:t>
+            </a:r>
+          </a:p>
+          <a:p>
+            <a:pPr lvl="1"/>
+            <a:r>
+              <a:rPr lang="en-US" sz="2000" dirty="0" smtClean="0"/>
+              <a:t>When </a:t>
+            </a:r>
+            <a:r>
+              <a:rPr lang="en-US" sz="2000" dirty="0"/>
+              <a:t>the user clicks a category then they will go to a product details </a:t>
+            </a:r>
+            <a:r>
+              <a:rPr lang="en-US" sz="2000" dirty="0" smtClean="0"/>
+              <a:t>page.</a:t>
             </a:r>
           </a:p>
         </p:txBody>
       </p:sp>
     </p:spTree>
+    <p:extLst>
+      <p:ext uri="{BB962C8B-B14F-4D97-AF65-F5344CB8AC3E}">
+        <p14:creationId xmlns:p14="http://schemas.microsoft.com/office/powerpoint/2010/main" val="3305498858"/>
+      </p:ext>
+    </p:extLst>
   </p:cSld>
   <p:clrMapOvr>
     <a:masterClrMapping/>
@@ -10311,7 +10415,7 @@
           <a:p>
             <a:r>
               <a:rPr lang="en-US" dirty="0" smtClean="0"/>
-              <a:t>Iteration Plan</a:t>
+              <a:t>Story Backlog</a:t>
             </a:r>
             <a:endParaRPr lang="en-US" dirty="0"/>
           </a:p>
@@ -10329,60 +10433,25 @@
         </p:nvSpPr>
         <p:spPr/>
         <p:txBody>
-          <a:bodyPr>
-            <a:normAutofit/>
-          </a:bodyPr>
+          <a:bodyPr/>
           <a:lstStyle/>
           <a:p>
             <a:r>
               <a:rPr lang="en-US" dirty="0" smtClean="0"/>
-              <a:t>Usually 2-4 weeks</a:t>
+              <a:t>This is just a bucket for all your stories</a:t>
             </a:r>
           </a:p>
           <a:p>
             <a:r>
               <a:rPr lang="en-US" dirty="0" smtClean="0"/>
-              <a:t>Do high risk / high priority work first</a:t>
+              <a:t>Keep it prioritized and organized!</a:t>
             </a:r>
           </a:p>
           <a:p>
             <a:r>
               <a:rPr lang="en-US" dirty="0" smtClean="0"/>
-              <a:t>How much can you do in one iteration?</a:t>
-            </a:r>
-          </a:p>
-          <a:p>
-            <a:pPr lvl="1"/>
-            <a:r>
-              <a:rPr lang="en-US" dirty="0" smtClean="0"/>
-              <a:t>Make sure everyone can be kept busy</a:t>
-            </a:r>
-          </a:p>
-          <a:p>
-            <a:pPr lvl="1"/>
-            <a:r>
-              <a:rPr lang="en-US" dirty="0" smtClean="0"/>
-              <a:t>Compare with previous work, if possible</a:t>
-            </a:r>
-          </a:p>
-          <a:p>
-            <a:pPr lvl="1"/>
-            <a:r>
-              <a:rPr lang="en-US" dirty="0" smtClean="0"/>
-              <a:t>If not, </a:t>
-            </a:r>
-            <a:r>
-              <a:rPr lang="en-US" i="1" dirty="0" smtClean="0"/>
-              <a:t>guess</a:t>
-            </a:r>
-            <a:r>
-              <a:rPr lang="en-US" dirty="0" smtClean="0"/>
-              <a:t>, it’s OK to be wrong!</a:t>
-            </a:r>
-          </a:p>
-          <a:p>
-            <a:pPr lvl="1"/>
-            <a:endParaRPr lang="en-US" dirty="0" smtClean="0"/>
+              <a:t>Pull estimated stories off this list to create an iteration plan</a:t>
+            </a:r>
           </a:p>
         </p:txBody>
       </p:sp>
@@ -10423,6 +10492,133 @@
       </p:grpSpPr>
       <p:sp>
         <p:nvSpPr>
+          <p:cNvPr id="2" name="Title 1"/>
+          <p:cNvSpPr>
+            <a:spLocks noGrp="1"/>
+          </p:cNvSpPr>
+          <p:nvPr>
+            <p:ph type="title"/>
+          </p:nvPr>
+        </p:nvSpPr>
+        <p:spPr/>
+        <p:txBody>
+          <a:bodyPr/>
+          <a:lstStyle/>
+          <a:p>
+            <a:r>
+              <a:rPr lang="en-US" dirty="0" smtClean="0"/>
+              <a:t>Iteration Plan</a:t>
+            </a:r>
+            <a:endParaRPr lang="en-US" dirty="0"/>
+          </a:p>
+        </p:txBody>
+      </p:sp>
+      <p:sp>
+        <p:nvSpPr>
+          <p:cNvPr id="3" name="Content Placeholder 2"/>
+          <p:cNvSpPr>
+            <a:spLocks noGrp="1"/>
+          </p:cNvSpPr>
+          <p:nvPr>
+            <p:ph idx="1"/>
+          </p:nvPr>
+        </p:nvSpPr>
+        <p:spPr/>
+        <p:txBody>
+          <a:bodyPr>
+            <a:normAutofit/>
+          </a:bodyPr>
+          <a:lstStyle/>
+          <a:p>
+            <a:r>
+              <a:rPr lang="en-US" dirty="0" smtClean="0"/>
+              <a:t>Usually 2-4 weeks</a:t>
+            </a:r>
+          </a:p>
+          <a:p>
+            <a:r>
+              <a:rPr lang="en-US" dirty="0" smtClean="0"/>
+              <a:t>Do high risk / high priority work first</a:t>
+            </a:r>
+          </a:p>
+          <a:p>
+            <a:r>
+              <a:rPr lang="en-US" dirty="0" smtClean="0"/>
+              <a:t>How much can you do in one iteration?</a:t>
+            </a:r>
+          </a:p>
+          <a:p>
+            <a:pPr lvl="1"/>
+            <a:r>
+              <a:rPr lang="en-US" dirty="0" smtClean="0"/>
+              <a:t>Make sure everyone can be kept busy</a:t>
+            </a:r>
+          </a:p>
+          <a:p>
+            <a:pPr lvl="1"/>
+            <a:r>
+              <a:rPr lang="en-US" dirty="0" smtClean="0"/>
+              <a:t>Compare with previous work, if possible</a:t>
+            </a:r>
+          </a:p>
+          <a:p>
+            <a:pPr lvl="1"/>
+            <a:r>
+              <a:rPr lang="en-US" dirty="0" smtClean="0"/>
+              <a:t>If not, </a:t>
+            </a:r>
+            <a:r>
+              <a:rPr lang="en-US" i="1" dirty="0" smtClean="0"/>
+              <a:t>guess</a:t>
+            </a:r>
+            <a:r>
+              <a:rPr lang="en-US" dirty="0" smtClean="0"/>
+              <a:t>, it’s OK to be wrong!</a:t>
+            </a:r>
+          </a:p>
+          <a:p>
+            <a:pPr lvl="1"/>
+            <a:endParaRPr lang="en-US" dirty="0" smtClean="0"/>
+          </a:p>
+        </p:txBody>
+      </p:sp>
+    </p:spTree>
+  </p:cSld>
+  <p:clrMapOvr>
+    <a:masterClrMapping/>
+  </p:clrMapOvr>
+  <p:transition>
+    <p:fade/>
+  </p:transition>
+  <p:timing>
+    <p:tnLst>
+      <p:par>
+        <p:cTn id="1" dur="indefinite" restart="never" nodeType="tmRoot"/>
+      </p:par>
+    </p:tnLst>
+  </p:timing>
+</p:sld>
+</file>
+
+<file path=ppt/slides/slide22.xml><?xml version="1.0" encoding="utf-8"?>
+<p:sld xmlns:a="http://schemas.openxmlformats.org/drawingml/2006/main" xmlns:r="http://schemas.openxmlformats.org/officeDocument/2006/relationships" xmlns:p="http://schemas.openxmlformats.org/presentationml/2006/main">
+  <p:cSld>
+    <p:spTree>
+      <p:nvGrpSpPr>
+        <p:cNvPr id="1" name=""/>
+        <p:cNvGrpSpPr/>
+        <p:nvPr/>
+      </p:nvGrpSpPr>
+      <p:grpSpPr>
+        <a:xfrm>
+          <a:off x="0" y="0"/>
+          <a:ext cx="0" cy="0"/>
+          <a:chOff x="0" y="0"/>
+          <a:chExt cx="0" cy="0"/>
+        </a:xfrm>
+      </p:grpSpPr>
+      <p:sp>
+        <p:nvSpPr>
           <p:cNvPr id="7" name="Title 6"/>
           <p:cNvSpPr>
             <a:spLocks noGrp="1"/>
@@ -10660,147 +10856,14 @@
   <p:clrMapOvr>
     <a:masterClrMapping/>
   </p:clrMapOvr>
-  <mc:AlternateContent xmlns:mc="http://schemas.openxmlformats.org/markup-compatibility/2006">
-    <mc:Choice xmlns:p14="http://schemas.microsoft.com/office/powerpoint/2010/main" Requires="p14">
+  <mc:AlternateContent xmlns:mc="http://schemas.openxmlformats.org/markup-compatibility/2006" xmlns:p14="http://schemas.microsoft.com/office/powerpoint/2010/main">
+    <mc:Choice Requires="p14">
       <p:transition spd="slow" p14:dur="2000"/>
     </mc:Choice>
-    <mc:Fallback>
+    <mc:Fallback xmlns="">
       <p:transition spd="slow"/>
     </mc:Fallback>
   </mc:AlternateContent>
-  <p:timing>
-    <p:tnLst>
-      <p:par>
-        <p:cTn id="1" dur="indefinite" restart="never" nodeType="tmRoot"/>
-      </p:par>
-    </p:tnLst>
-  </p:timing>
-</p:sld>
-</file>
-
-<file path=ppt/slides/slide22.xml><?xml version="1.0" encoding="utf-8"?>
-<p:sld xmlns:a="http://schemas.openxmlformats.org/drawingml/2006/main" xmlns:r="http://schemas.openxmlformats.org/officeDocument/2006/relationships" xmlns:p="http://schemas.openxmlformats.org/presentationml/2006/main">
-  <p:cSld>
-    <p:spTree>
-      <p:nvGrpSpPr>
-        <p:cNvPr id="1" name=""/>
-        <p:cNvGrpSpPr/>
-        <p:nvPr/>
-      </p:nvGrpSpPr>
-      <p:grpSpPr>
-        <a:xfrm>
-          <a:off x="0" y="0"/>
-          <a:ext cx="0" cy="0"/>
-          <a:chOff x="0" y="0"/>
-          <a:chExt cx="0" cy="0"/>
-        </a:xfrm>
-      </p:grpSpPr>
-      <p:sp>
-        <p:nvSpPr>
-          <p:cNvPr id="2" name="Title 1"/>
-          <p:cNvSpPr>
-            <a:spLocks noGrp="1"/>
-          </p:cNvSpPr>
-          <p:nvPr>
-            <p:ph type="title"/>
-          </p:nvPr>
-        </p:nvSpPr>
-        <p:spPr/>
-        <p:txBody>
-          <a:bodyPr/>
-          <a:lstStyle/>
-          <a:p>
-            <a:r>
-              <a:rPr lang="en-US" smtClean="0"/>
-              <a:t>Team Velocity </a:t>
-            </a:r>
-            <a:endParaRPr lang="en-US" dirty="0"/>
-          </a:p>
-        </p:txBody>
-      </p:sp>
-      <p:sp>
-        <p:nvSpPr>
-          <p:cNvPr id="3" name="Content Placeholder 2"/>
-          <p:cNvSpPr>
-            <a:spLocks noGrp="1"/>
-          </p:cNvSpPr>
-          <p:nvPr>
-            <p:ph idx="1"/>
-          </p:nvPr>
-        </p:nvSpPr>
-        <p:spPr/>
-        <p:txBody>
-          <a:bodyPr>
-            <a:normAutofit/>
-          </a:bodyPr>
-          <a:lstStyle/>
-          <a:p>
-            <a:r>
-              <a:rPr lang="en-US" sz="3200" dirty="0" smtClean="0"/>
-              <a:t>Velocity is the number of points you </a:t>
-            </a:r>
-            <a:r>
-              <a:rPr lang="en-US" sz="3200" b="1" dirty="0" smtClean="0"/>
-              <a:t>completed</a:t>
-            </a:r>
-            <a:r>
-              <a:rPr lang="en-US" sz="3200" dirty="0" smtClean="0"/>
-              <a:t> in previous iterations</a:t>
-            </a:r>
-            <a:endParaRPr lang="en-US" sz="3200" b="1" dirty="0" smtClean="0"/>
-          </a:p>
-          <a:p>
-            <a:r>
-              <a:rPr lang="en-US" sz="3200" dirty="0" smtClean="0"/>
-              <a:t>Over time this number will stabilize (usually after 3 iterations)</a:t>
-            </a:r>
-          </a:p>
-          <a:p>
-            <a:pPr algn="ctr">
-              <a:buNone/>
-            </a:pPr>
-            <a:endParaRPr lang="en-US" sz="3200" dirty="0" smtClean="0"/>
-          </a:p>
-          <a:p>
-            <a:pPr algn="ctr">
-              <a:buNone/>
-            </a:pPr>
-            <a:r>
-              <a:rPr lang="en-US" sz="3200" dirty="0" smtClean="0">
-                <a:solidFill>
-                  <a:schemeClr val="accent6">
-                    <a:lumMod val="75000"/>
-                  </a:schemeClr>
-                </a:solidFill>
-              </a:rPr>
-              <a:t>Total Points / Velocity * Iteration length = </a:t>
-            </a:r>
-          </a:p>
-          <a:p>
-            <a:pPr algn="ctr">
-              <a:buNone/>
-            </a:pPr>
-            <a:r>
-              <a:rPr lang="en-US" sz="3200" dirty="0" smtClean="0">
-                <a:solidFill>
-                  <a:schemeClr val="accent6">
-                    <a:lumMod val="75000"/>
-                  </a:schemeClr>
-                </a:solidFill>
-              </a:rPr>
-              <a:t>Calendar Time!</a:t>
-            </a:r>
-          </a:p>
-        </p:txBody>
-      </p:sp>
-    </p:spTree>
-  </p:cSld>
-  <p:clrMapOvr>
-    <a:masterClrMapping/>
-  </p:clrMapOvr>
-  <p:transition>
-    <p:fade/>
-  </p:transition>
   <p:timing>
     <p:tnLst>
       <p:par>
@@ -10844,8 +10907,8 @@
           <a:lstStyle/>
           <a:p>
             <a:r>
-              <a:rPr lang="en-US" dirty="0" smtClean="0"/>
-              <a:t>Re-estimation</a:t>
+              <a:rPr lang="en-US" smtClean="0"/>
+              <a:t>Team Velocity </a:t>
             </a:r>
             <a:endParaRPr lang="en-US" dirty="0"/>
           </a:p>
@@ -10869,30 +10932,59 @@
           <a:lstStyle/>
           <a:p>
             <a:r>
-              <a:rPr lang="en-US" dirty="0" smtClean="0"/>
-              <a:t>Re-estimate when you have new information that affects your previous estimates</a:t>
-            </a:r>
-          </a:p>
-          <a:p>
-            <a:r>
-              <a:rPr lang="en-US" dirty="0" smtClean="0"/>
-              <a:t>Review your upcoming story estimates before each iteration, do they still make sense?</a:t>
-            </a:r>
-          </a:p>
-          <a:p>
-            <a:r>
-              <a:rPr lang="en-US" dirty="0" smtClean="0"/>
-              <a:t>Re-estimate if you change a story</a:t>
-            </a:r>
-          </a:p>
-          <a:p>
-            <a:r>
-              <a:rPr lang="en-US" b="1" dirty="0" smtClean="0"/>
-              <a:t>NEVER </a:t>
-            </a:r>
-            <a:r>
-              <a:rPr lang="en-US" dirty="0" smtClean="0"/>
-              <a:t>change an estimate after a story has entered development!</a:t>
+              <a:rPr lang="en-US" sz="3200" dirty="0" smtClean="0"/>
+              <a:t>Velocity is the number of points you </a:t>
+            </a:r>
+            <a:r>
+              <a:rPr lang="en-US" sz="3200" b="1" dirty="0" smtClean="0"/>
+              <a:t>completed</a:t>
+            </a:r>
+            <a:r>
+              <a:rPr lang="en-US" sz="3200" dirty="0" smtClean="0"/>
+              <a:t> in previous iterations</a:t>
+            </a:r>
+            <a:endParaRPr lang="en-US" sz="3200" b="1" dirty="0" smtClean="0"/>
+          </a:p>
+          <a:p>
+            <a:r>
+              <a:rPr lang="en-US" sz="3200" dirty="0" smtClean="0"/>
+              <a:t>Over time this number will stabilize (usually after 3 iterations)</a:t>
+            </a:r>
+          </a:p>
+          <a:p>
+            <a:pPr algn="ctr">
+              <a:buNone/>
+            </a:pPr>
+            <a:endParaRPr lang="en-US" sz="3200" dirty="0" smtClean="0"/>
+          </a:p>
+          <a:p>
+            <a:pPr algn="ctr">
+              <a:buNone/>
+            </a:pPr>
+            <a:r>
+              <a:rPr lang="en-US" sz="3200" dirty="0" smtClean="0">
+                <a:solidFill>
+                  <a:schemeClr val="accent6">
+                    <a:lumMod val="75000"/>
+                  </a:schemeClr>
+                </a:solidFill>
+              </a:rPr>
+              <a:t>Total Points / Velocity * Iteration length = </a:t>
+            </a:r>
+          </a:p>
+          <a:p>
+            <a:pPr algn="ctr">
+              <a:buNone/>
+            </a:pPr>
+            <a:r>
+              <a:rPr lang="en-US" sz="3200" dirty="0" smtClean="0">
+                <a:solidFill>
+                  <a:schemeClr val="accent6">
+                    <a:lumMod val="75000"/>
+                  </a:schemeClr>
+                </a:solidFill>
+              </a:rPr>
+              <a:t>Calendar Time!</a:t>
             </a:r>
           </a:p>
         </p:txBody>
@@ -10949,6 +11041,110 @@
           <a:p>
             <a:r>
               <a:rPr lang="en-US" dirty="0" smtClean="0"/>
+              <a:t>Re-estimation</a:t>
+            </a:r>
+            <a:endParaRPr lang="en-US" dirty="0"/>
+          </a:p>
+        </p:txBody>
+      </p:sp>
+      <p:sp>
+        <p:nvSpPr>
+          <p:cNvPr id="3" name="Content Placeholder 2"/>
+          <p:cNvSpPr>
+            <a:spLocks noGrp="1"/>
+          </p:cNvSpPr>
+          <p:nvPr>
+            <p:ph idx="1"/>
+          </p:nvPr>
+        </p:nvSpPr>
+        <p:spPr/>
+        <p:txBody>
+          <a:bodyPr>
+            <a:normAutofit/>
+          </a:bodyPr>
+          <a:lstStyle/>
+          <a:p>
+            <a:r>
+              <a:rPr lang="en-US" dirty="0" smtClean="0"/>
+              <a:t>Re-estimate when you have new information that affects your previous estimates</a:t>
+            </a:r>
+          </a:p>
+          <a:p>
+            <a:r>
+              <a:rPr lang="en-US" dirty="0" smtClean="0"/>
+              <a:t>Review your upcoming story estimates before each iteration, do they still make sense?</a:t>
+            </a:r>
+          </a:p>
+          <a:p>
+            <a:r>
+              <a:rPr lang="en-US" dirty="0" smtClean="0"/>
+              <a:t>Re-estimate if you change a story</a:t>
+            </a:r>
+          </a:p>
+          <a:p>
+            <a:r>
+              <a:rPr lang="en-US" b="1" dirty="0" smtClean="0"/>
+              <a:t>NEVER </a:t>
+            </a:r>
+            <a:r>
+              <a:rPr lang="en-US" dirty="0" smtClean="0"/>
+              <a:t>change an estimate after a story has entered development!</a:t>
+            </a:r>
+          </a:p>
+        </p:txBody>
+      </p:sp>
+    </p:spTree>
+  </p:cSld>
+  <p:clrMapOvr>
+    <a:masterClrMapping/>
+  </p:clrMapOvr>
+  <p:transition>
+    <p:fade/>
+  </p:transition>
+  <p:timing>
+    <p:tnLst>
+      <p:par>
+        <p:cTn id="1" dur="indefinite" restart="never" nodeType="tmRoot"/>
+      </p:par>
+    </p:tnLst>
+  </p:timing>
+</p:sld>
+</file>
+
+<file path=ppt/slides/slide25.xml><?xml version="1.0" encoding="utf-8"?>
+<p:sld xmlns:a="http://schemas.openxmlformats.org/drawingml/2006/main" xmlns:r="http://schemas.openxmlformats.org/officeDocument/2006/relationships" xmlns:p="http://schemas.openxmlformats.org/presentationml/2006/main">
+  <p:cSld>
+    <p:spTree>
+      <p:nvGrpSpPr>
+        <p:cNvPr id="1" name=""/>
+        <p:cNvGrpSpPr/>
+        <p:nvPr/>
+      </p:nvGrpSpPr>
+      <p:grpSpPr>
+        <a:xfrm>
+          <a:off x="0" y="0"/>
+          <a:ext cx="0" cy="0"/>
+          <a:chOff x="0" y="0"/>
+          <a:chExt cx="0" cy="0"/>
+        </a:xfrm>
+      </p:grpSpPr>
+      <p:sp>
+        <p:nvSpPr>
+          <p:cNvPr id="2" name="Title 1"/>
+          <p:cNvSpPr>
+            <a:spLocks noGrp="1"/>
+          </p:cNvSpPr>
+          <p:nvPr>
+            <p:ph type="title"/>
+          </p:nvPr>
+        </p:nvSpPr>
+        <p:spPr/>
+        <p:txBody>
+          <a:bodyPr/>
+          <a:lstStyle/>
+          <a:p>
+            <a:r>
+              <a:rPr lang="en-US" dirty="0" smtClean="0"/>
               <a:t>Lab - Planning Poker</a:t>
             </a:r>
             <a:endParaRPr lang="en-US" dirty="0"/>
@@ -11163,7 +11359,15 @@
             </a:pPr>
             <a:r>
               <a:rPr lang="en-US" dirty="0" smtClean="0"/>
-              <a:t>In software engineering, estimation is the process of speculating the amount of effort required to complete a task or set of tasks.</a:t>
+              <a:t>In software engineering, estimation is the process of speculating the amount of </a:t>
+            </a:r>
+            <a:r>
+              <a:rPr lang="en-US" b="1" dirty="0" smtClean="0"/>
+              <a:t>effort </a:t>
+            </a:r>
+            <a:r>
+              <a:rPr lang="en-US" dirty="0" smtClean="0"/>
+              <a:t>required to complete a task or set of tasks.</a:t>
             </a:r>
           </a:p>
           <a:p>

</xml_diff>